<commit_message>
Adding to combination slide.
git-svn-id: https://svn.ece.auckland.ac.nz/svn/p4p-2010-g79@58 a75856b6-468a-0410-9532-ba8c368bb4fd
</commit_message>
<xml_diff>
--- a/docs/conference presentation - the real thing.pptx
+++ b/docs/conference presentation - the real thing.pptx
@@ -205,7 +205,7 @@
             <a:fld id="{83A9489B-8DE9-42BA-AD60-DD2EDDD28D61}" type="datetimeFigureOut">
               <a:rPr lang="en-NZ" smtClean="0"/>
               <a:pPr/>
-              <a:t>7/09/2010</a:t>
+              <a:t>8/09/2010</a:t>
             </a:fld>
             <a:endParaRPr lang="en-NZ"/>
           </a:p>
@@ -805,25 +805,7 @@
                 </a:solidFill>
                 <a:latin typeface="Arial" charset="0"/>
               </a:rPr>
-              <a:t>Swapping values was initially a problem. In the case of a swap, we have three assignments. First, item a is assigned to a temporary. Next, item b as assigned to a. Finally</a:t>
-            </a:r>
-            <a:r>
-              <a:rPr lang="en-US" sz="1200" dirty="0" smtClean="0">
-                <a:solidFill>
-                  <a:srgbClr val="000000"/>
-                </a:solidFill>
-                <a:latin typeface="Arial" charset="0"/>
-              </a:rPr>
-              <a:t>, the </a:t>
-            </a:r>
-            <a:r>
-              <a:rPr lang="en-US" sz="1200" dirty="0" smtClean="0">
-                <a:solidFill>
-                  <a:srgbClr val="000000"/>
-                </a:solidFill>
-                <a:latin typeface="Arial" charset="0"/>
-              </a:rPr>
-              <a:t>temporary is assigned to b.</a:t>
+              <a:t>Swapping values was initially a problem. In the case of a swap, we have three assignments. First, item a is assigned to a temporary. Next, item b as assigned to a. Finally, the temporary is assigned to b.</a:t>
             </a:r>
             <a:endParaRPr lang="en-US" dirty="0" smtClean="0"/>
           </a:p>
@@ -859,7 +841,16 @@
                 </a:solidFill>
                 <a:latin typeface="Arial" charset="0"/>
               </a:rPr>
-              <a:t>Our program would </a:t>
+              <a:t>Our program would not display the temporary, as it would clutter the diagram. It would instead show the assignment from b to a first. Then it would attempt to show the assignment from a to b, but the history manager would observe that the value of a had changed since it was read. The animation would then be forced to treat the</a:t>
+            </a:r>
+            <a:r>
+              <a:rPr lang="en-US" sz="1200" baseline="0" dirty="0" smtClean="0">
+                <a:solidFill>
+                  <a:srgbClr val="000000"/>
+                </a:solidFill>
+                <a:latin typeface="Arial" charset="0"/>
+              </a:rPr>
+              <a:t> old value of a</a:t>
             </a:r>
             <a:r>
               <a:rPr lang="en-US" sz="1200" dirty="0" smtClean="0">
@@ -868,70 +859,7 @@
                 </a:solidFill>
                 <a:latin typeface="Arial" charset="0"/>
               </a:rPr>
-              <a:t>not </a:t>
-            </a:r>
-            <a:r>
-              <a:rPr lang="en-US" sz="1200" dirty="0" smtClean="0">
-                <a:solidFill>
-                  <a:srgbClr val="000000"/>
-                </a:solidFill>
-                <a:latin typeface="Arial" charset="0"/>
-              </a:rPr>
-              <a:t>display the temporary, as it would clutter the diagram. It would instead show the assignment from b to a first. Then it would attempt to show the assignment from a to b, but the history manager would observe that the value of </a:t>
-            </a:r>
-            <a:r>
-              <a:rPr lang="en-US" sz="1200" dirty="0" smtClean="0">
-                <a:solidFill>
-                  <a:srgbClr val="000000"/>
-                </a:solidFill>
-                <a:latin typeface="Arial" charset="0"/>
-              </a:rPr>
-              <a:t>a </a:t>
-            </a:r>
-            <a:r>
-              <a:rPr lang="en-US" sz="1200" dirty="0" smtClean="0">
-                <a:solidFill>
-                  <a:srgbClr val="000000"/>
-                </a:solidFill>
-                <a:latin typeface="Arial" charset="0"/>
-              </a:rPr>
-              <a:t>had changed since it was read. The animation would then be forced to treat </a:t>
-            </a:r>
-            <a:r>
-              <a:rPr lang="en-US" sz="1200" dirty="0" smtClean="0">
-                <a:solidFill>
-                  <a:srgbClr val="000000"/>
-                </a:solidFill>
-                <a:latin typeface="Arial" charset="0"/>
-              </a:rPr>
-              <a:t>the</a:t>
-            </a:r>
-            <a:r>
-              <a:rPr lang="en-US" sz="1200" baseline="0" dirty="0" smtClean="0">
-                <a:solidFill>
-                  <a:srgbClr val="000000"/>
-                </a:solidFill>
-                <a:latin typeface="Arial" charset="0"/>
-              </a:rPr>
-              <a:t> old value of a</a:t>
-            </a:r>
-            <a:r>
-              <a:rPr lang="en-US" sz="1200" dirty="0" smtClean="0">
-                <a:solidFill>
-                  <a:srgbClr val="000000"/>
-                </a:solidFill>
-                <a:latin typeface="Arial" charset="0"/>
-              </a:rPr>
-              <a:t> </a:t>
-            </a:r>
-            <a:r>
-              <a:rPr lang="en-US" sz="1200" dirty="0" smtClean="0">
-                <a:solidFill>
-                  <a:srgbClr val="000000"/>
-                </a:solidFill>
-                <a:latin typeface="Arial" charset="0"/>
-              </a:rPr>
-              <a:t>as an unknown value, and the user could not see that a swap occurred.</a:t>
+              <a:t> as an unknown value, and the user could not see that a swap occurred.</a:t>
             </a:r>
             <a:endParaRPr lang="en-US" dirty="0" smtClean="0"/>
           </a:p>
@@ -971,6 +899,17 @@
             </a:r>
           </a:p>
           <a:p>
+            <a:endParaRPr lang="en-NZ" dirty="0" smtClean="0"/>
+          </a:p>
+          <a:p>
+            <a:r>
+              <a:rPr lang="en-NZ" dirty="0" smtClean="0"/>
+              <a:t>We</a:t>
+            </a:r>
+            <a:r>
+              <a:rPr lang="en-NZ" baseline="0" dirty="0" smtClean="0"/>
+              <a:t> also detect cases where this kind of combination is not possible. If one of the actions depends on the result of another action in the group, combination is not feasible. In theory, it is possible for a group of actions to both require combination due to one data dependency and be infeasible to combine due to another data dependency. In this case our system will choose not to combine, but in our experience such problematic cases are very rare.</a:t>
+            </a:r>
             <a:endParaRPr lang="en-NZ" dirty="0"/>
           </a:p>
         </p:txBody>
@@ -2883,11 +2822,7 @@
           <a:p>
             <a:r>
               <a:rPr lang="en-NZ" dirty="0" smtClean="0"/>
-              <a:t>The view is in charge of displaying data </a:t>
-            </a:r>
-            <a:r>
-              <a:rPr lang="en-NZ" dirty="0" smtClean="0"/>
-              <a:t>structures</a:t>
+              <a:t>The view is in charge of displaying data structures</a:t>
             </a:r>
             <a:r>
               <a:rPr lang="en-NZ" baseline="0" dirty="0" smtClean="0"/>
@@ -2906,11 +2841,7 @@
           <a:p>
             <a:r>
               <a:rPr lang="en-NZ" baseline="0" dirty="0" smtClean="0"/>
-              <a:t>The view is also in charge of animating any changes which occur to data structures. </a:t>
-            </a:r>
-            <a:r>
-              <a:rPr lang="en-NZ" baseline="0" dirty="0" smtClean="0"/>
-              <a:t>It is notified of these changes by the </a:t>
+              <a:t>The view is also in charge of animating any changes which occur to data structures. It is notified of these changes by the </a:t>
             </a:r>
             <a:r>
               <a:rPr lang="en-NZ" baseline="0" dirty="0" err="1" smtClean="0"/>
@@ -2918,11 +2849,7 @@
             </a:r>
             <a:r>
               <a:rPr lang="en-NZ" baseline="0" dirty="0" smtClean="0"/>
-              <a:t>, which provides an Action object encapsulating a change. Typical actions would include creation of a data structure, insertion or deletion of elements, and assignment of one element to another. Based on this information, the view animates values moving and combining as appropriate. </a:t>
-            </a:r>
-            <a:r>
-              <a:rPr lang="en-NZ" baseline="0" dirty="0" smtClean="0"/>
-              <a:t>An assignment, for example, would show the value moving from the source element to the destination, and overwriting the current value at the destination.</a:t>
+              <a:t>, which provides an Action object encapsulating a change. Typical actions would include creation of a data structure, insertion or deletion of elements, and assignment of one element to another. Based on this information, the view animates values moving and combining as appropriate. An assignment, for example, would show the value moving from the source element to the destination, and overwriting the current value at the destination.</a:t>
             </a:r>
           </a:p>
           <a:p>
@@ -3145,7 +3072,7 @@
             <a:fld id="{6C1BFA94-9F69-40E4-AE0E-2C03D09AE259}" type="datetimeFigureOut">
               <a:rPr lang="en-NZ" smtClean="0"/>
               <a:pPr/>
-              <a:t>7/09/2010</a:t>
+              <a:t>8/09/2010</a:t>
             </a:fld>
             <a:endParaRPr lang="en-NZ"/>
           </a:p>
@@ -3312,7 +3239,7 @@
             <a:fld id="{6C1BFA94-9F69-40E4-AE0E-2C03D09AE259}" type="datetimeFigureOut">
               <a:rPr lang="en-NZ" smtClean="0"/>
               <a:pPr/>
-              <a:t>7/09/2010</a:t>
+              <a:t>8/09/2010</a:t>
             </a:fld>
             <a:endParaRPr lang="en-NZ"/>
           </a:p>
@@ -3489,7 +3416,7 @@
             <a:fld id="{6C1BFA94-9F69-40E4-AE0E-2C03D09AE259}" type="datetimeFigureOut">
               <a:rPr lang="en-NZ" smtClean="0"/>
               <a:pPr/>
-              <a:t>7/09/2010</a:t>
+              <a:t>8/09/2010</a:t>
             </a:fld>
             <a:endParaRPr lang="en-NZ"/>
           </a:p>
@@ -3656,7 +3583,7 @@
             <a:fld id="{6C1BFA94-9F69-40E4-AE0E-2C03D09AE259}" type="datetimeFigureOut">
               <a:rPr lang="en-NZ" smtClean="0"/>
               <a:pPr/>
-              <a:t>7/09/2010</a:t>
+              <a:t>8/09/2010</a:t>
             </a:fld>
             <a:endParaRPr lang="en-NZ"/>
           </a:p>
@@ -3900,7 +3827,7 @@
             <a:fld id="{6C1BFA94-9F69-40E4-AE0E-2C03D09AE259}" type="datetimeFigureOut">
               <a:rPr lang="en-NZ" smtClean="0"/>
               <a:pPr/>
-              <a:t>7/09/2010</a:t>
+              <a:t>8/09/2010</a:t>
             </a:fld>
             <a:endParaRPr lang="en-NZ"/>
           </a:p>
@@ -4166,7 +4093,7 @@
             <a:fld id="{6C1BFA94-9F69-40E4-AE0E-2C03D09AE259}" type="datetimeFigureOut">
               <a:rPr lang="en-NZ" smtClean="0"/>
               <a:pPr/>
-              <a:t>7/09/2010</a:t>
+              <a:t>8/09/2010</a:t>
             </a:fld>
             <a:endParaRPr lang="en-NZ"/>
           </a:p>
@@ -4546,7 +4473,7 @@
             <a:fld id="{6C1BFA94-9F69-40E4-AE0E-2C03D09AE259}" type="datetimeFigureOut">
               <a:rPr lang="en-NZ" smtClean="0"/>
               <a:pPr/>
-              <a:t>7/09/2010</a:t>
+              <a:t>8/09/2010</a:t>
             </a:fld>
             <a:endParaRPr lang="en-NZ"/>
           </a:p>
@@ -4698,7 +4625,7 @@
             <a:fld id="{6C1BFA94-9F69-40E4-AE0E-2C03D09AE259}" type="datetimeFigureOut">
               <a:rPr lang="en-NZ" smtClean="0"/>
               <a:pPr/>
-              <a:t>7/09/2010</a:t>
+              <a:t>8/09/2010</a:t>
             </a:fld>
             <a:endParaRPr lang="en-NZ"/>
           </a:p>
@@ -4790,7 +4717,7 @@
             <a:fld id="{6C1BFA94-9F69-40E4-AE0E-2C03D09AE259}" type="datetimeFigureOut">
               <a:rPr lang="en-NZ" smtClean="0"/>
               <a:pPr/>
-              <a:t>7/09/2010</a:t>
+              <a:t>8/09/2010</a:t>
             </a:fld>
             <a:endParaRPr lang="en-NZ"/>
           </a:p>
@@ -5053,7 +4980,7 @@
             <a:fld id="{6C1BFA94-9F69-40E4-AE0E-2C03D09AE259}" type="datetimeFigureOut">
               <a:rPr lang="en-NZ" smtClean="0"/>
               <a:pPr/>
-              <a:t>7/09/2010</a:t>
+              <a:t>8/09/2010</a:t>
             </a:fld>
             <a:endParaRPr lang="en-NZ"/>
           </a:p>
@@ -5343,7 +5270,7 @@
             <a:fld id="{6C1BFA94-9F69-40E4-AE0E-2C03D09AE259}" type="datetimeFigureOut">
               <a:rPr lang="en-NZ" smtClean="0"/>
               <a:pPr/>
-              <a:t>7/09/2010</a:t>
+              <a:t>8/09/2010</a:t>
             </a:fld>
             <a:endParaRPr lang="en-NZ"/>
           </a:p>
@@ -6116,7 +6043,7 @@
             <a:fld id="{6C1BFA94-9F69-40E4-AE0E-2C03D09AE259}" type="datetimeFigureOut">
               <a:rPr lang="en-NZ" smtClean="0"/>
               <a:pPr/>
-              <a:t>7/09/2010</a:t>
+              <a:t>8/09/2010</a:t>
             </a:fld>
             <a:endParaRPr lang="en-NZ"/>
           </a:p>
@@ -6959,16 +6886,1424 @@
             </a:r>
           </a:p>
           <a:p>
-            <a:r>
-              <a:rPr lang="en-NZ" dirty="0" smtClean="0"/>
-              <a:t>diagram</a:t>
-            </a:r>
-          </a:p>
-          <a:p>
+            <a:pPr>
+              <a:buNone/>
+            </a:pPr>
             <a:endParaRPr lang="en-NZ" dirty="0"/>
           </a:p>
         </p:txBody>
       </p:sp>
+      <p:sp>
+        <p:nvSpPr>
+          <p:cNvPr id="4" name="Rectangle 3"/>
+          <p:cNvSpPr>
+            <a:spLocks noChangeAspect="1"/>
+          </p:cNvSpPr>
+          <p:nvPr/>
+        </p:nvSpPr>
+        <p:spPr>
+          <a:xfrm>
+            <a:off x="395536" y="4293096"/>
+            <a:ext cx="1843069" cy="400110"/>
+          </a:xfrm>
+          <a:prstGeom prst="rect">
+            <a:avLst/>
+          </a:prstGeom>
+          <a:noFill/>
+          <a:ln>
+            <a:noFill/>
+          </a:ln>
+          <a:effectLst>
+            <a:outerShdw blurRad="50800" dist="38100" dir="2700000" algn="tl" rotWithShape="0">
+              <a:prstClr val="black">
+                <a:alpha val="40000"/>
+              </a:prstClr>
+            </a:outerShdw>
+          </a:effectLst>
+        </p:spPr>
+        <p:txBody>
+          <a:bodyPr wrap="square" lIns="91440" tIns="45720" rIns="91440" bIns="45720">
+            <a:spAutoFit/>
+          </a:bodyPr>
+          <a:lstStyle/>
+          <a:p>
+            <a:pPr algn="ctr"/>
+            <a:r>
+              <a:rPr lang="en-US" sz="2000" b="1" cap="none" spc="0" dirty="0" smtClean="0">
+                <a:ln w="12700">
+                  <a:noFill/>
+                  <a:prstDash val="solid"/>
+                </a:ln>
+                <a:effectLst>
+                  <a:outerShdw blurRad="41275" dist="20320" dir="1800000" algn="tl" rotWithShape="0">
+                    <a:srgbClr val="000000">
+                      <a:alpha val="40000"/>
+                    </a:srgbClr>
+                  </a:outerShdw>
+                </a:effectLst>
+                <a:latin typeface="Calibri" pitchFamily="34" charset="0"/>
+                <a:cs typeface="Calibri" pitchFamily="34" charset="0"/>
+              </a:rPr>
+              <a:t>Algorithm</a:t>
+            </a:r>
+            <a:endParaRPr lang="en-US" sz="2000" b="1" cap="none" spc="0" dirty="0">
+              <a:ln w="12700">
+                <a:noFill/>
+                <a:prstDash val="solid"/>
+              </a:ln>
+              <a:effectLst>
+                <a:outerShdw blurRad="41275" dist="20320" dir="1800000" algn="tl" rotWithShape="0">
+                  <a:srgbClr val="000000">
+                    <a:alpha val="40000"/>
+                  </a:srgbClr>
+                </a:outerShdw>
+              </a:effectLst>
+              <a:latin typeface="Calibri" pitchFamily="34" charset="0"/>
+              <a:cs typeface="Calibri" pitchFamily="34" charset="0"/>
+            </a:endParaRPr>
+          </a:p>
+        </p:txBody>
+      </p:sp>
+      <p:sp>
+        <p:nvSpPr>
+          <p:cNvPr id="5" name="TextBox 4"/>
+          <p:cNvSpPr txBox="1">
+            <a:spLocks noChangeAspect="1"/>
+          </p:cNvSpPr>
+          <p:nvPr/>
+        </p:nvSpPr>
+        <p:spPr>
+          <a:xfrm>
+            <a:off x="395536" y="4725144"/>
+            <a:ext cx="1872208" cy="738664"/>
+          </a:xfrm>
+          <a:prstGeom prst="rect">
+            <a:avLst/>
+          </a:prstGeom>
+          <a:solidFill>
+            <a:schemeClr val="accent3">
+              <a:lumMod val="20000"/>
+              <a:lumOff val="80000"/>
+            </a:schemeClr>
+          </a:solidFill>
+          <a:ln>
+            <a:solidFill>
+              <a:schemeClr val="tx1"/>
+            </a:solidFill>
+          </a:ln>
+        </p:spPr>
+        <p:txBody>
+          <a:bodyPr wrap="square" rtlCol="0">
+            <a:spAutoFit/>
+          </a:bodyPr>
+          <a:lstStyle/>
+          <a:p>
+            <a:r>
+              <a:rPr lang="en-NZ" sz="1400" dirty="0">
+                <a:solidFill>
+                  <a:schemeClr val="tx2"/>
+                </a:solidFill>
+                <a:latin typeface="Calibri" pitchFamily="34" charset="0"/>
+                <a:cs typeface="Calibri" pitchFamily="34" charset="0"/>
+              </a:rPr>
+              <a:t>i</a:t>
+            </a:r>
+            <a:r>
+              <a:rPr lang="en-NZ" sz="1400" dirty="0" smtClean="0">
+                <a:solidFill>
+                  <a:schemeClr val="tx2"/>
+                </a:solidFill>
+                <a:latin typeface="Calibri" pitchFamily="34" charset="0"/>
+                <a:cs typeface="Calibri" pitchFamily="34" charset="0"/>
+              </a:rPr>
+              <a:t>nt</a:t>
+            </a:r>
+            <a:r>
+              <a:rPr lang="en-NZ" sz="1400" dirty="0" smtClean="0">
+                <a:latin typeface="Calibri" pitchFamily="34" charset="0"/>
+                <a:cs typeface="Calibri" pitchFamily="34" charset="0"/>
+              </a:rPr>
+              <a:t> temp = array[</a:t>
+            </a:r>
+            <a:r>
+              <a:rPr lang="en-NZ" sz="1400" dirty="0" smtClean="0">
+                <a:solidFill>
+                  <a:schemeClr val="accent2"/>
+                </a:solidFill>
+                <a:latin typeface="Calibri" pitchFamily="34" charset="0"/>
+                <a:cs typeface="Calibri" pitchFamily="34" charset="0"/>
+              </a:rPr>
+              <a:t>1</a:t>
+            </a:r>
+            <a:r>
+              <a:rPr lang="en-NZ" sz="1400" dirty="0" smtClean="0">
+                <a:latin typeface="Calibri" pitchFamily="34" charset="0"/>
+                <a:cs typeface="Calibri" pitchFamily="34" charset="0"/>
+              </a:rPr>
+              <a:t>];</a:t>
+            </a:r>
+          </a:p>
+          <a:p>
+            <a:r>
+              <a:rPr lang="en-NZ" sz="1400" dirty="0">
+                <a:latin typeface="Calibri" pitchFamily="34" charset="0"/>
+                <a:cs typeface="Calibri" pitchFamily="34" charset="0"/>
+              </a:rPr>
+              <a:t>a</a:t>
+            </a:r>
+            <a:r>
+              <a:rPr lang="en-NZ" sz="1400" dirty="0" smtClean="0">
+                <a:latin typeface="Calibri" pitchFamily="34" charset="0"/>
+                <a:cs typeface="Calibri" pitchFamily="34" charset="0"/>
+              </a:rPr>
+              <a:t>rray[</a:t>
+            </a:r>
+            <a:r>
+              <a:rPr lang="en-NZ" sz="1400" dirty="0" smtClean="0">
+                <a:solidFill>
+                  <a:schemeClr val="accent2"/>
+                </a:solidFill>
+                <a:latin typeface="Calibri" pitchFamily="34" charset="0"/>
+                <a:cs typeface="Calibri" pitchFamily="34" charset="0"/>
+              </a:rPr>
+              <a:t>1</a:t>
+            </a:r>
+            <a:r>
+              <a:rPr lang="en-NZ" sz="1400" dirty="0" smtClean="0">
+                <a:latin typeface="Calibri" pitchFamily="34" charset="0"/>
+                <a:cs typeface="Calibri" pitchFamily="34" charset="0"/>
+              </a:rPr>
+              <a:t>] = array[</a:t>
+            </a:r>
+            <a:r>
+              <a:rPr lang="en-NZ" sz="1400" dirty="0" smtClean="0">
+                <a:solidFill>
+                  <a:schemeClr val="accent2"/>
+                </a:solidFill>
+                <a:latin typeface="Calibri" pitchFamily="34" charset="0"/>
+                <a:cs typeface="Calibri" pitchFamily="34" charset="0"/>
+              </a:rPr>
+              <a:t>0</a:t>
+            </a:r>
+            <a:r>
+              <a:rPr lang="en-NZ" sz="1400" dirty="0" smtClean="0">
+                <a:latin typeface="Calibri" pitchFamily="34" charset="0"/>
+                <a:cs typeface="Calibri" pitchFamily="34" charset="0"/>
+              </a:rPr>
+              <a:t>];</a:t>
+            </a:r>
+          </a:p>
+          <a:p>
+            <a:r>
+              <a:rPr lang="en-NZ" sz="1400" dirty="0">
+                <a:latin typeface="Calibri" pitchFamily="34" charset="0"/>
+                <a:cs typeface="Calibri" pitchFamily="34" charset="0"/>
+              </a:rPr>
+              <a:t>a</a:t>
+            </a:r>
+            <a:r>
+              <a:rPr lang="en-NZ" sz="1400" dirty="0" smtClean="0">
+                <a:latin typeface="Calibri" pitchFamily="34" charset="0"/>
+                <a:cs typeface="Calibri" pitchFamily="34" charset="0"/>
+              </a:rPr>
+              <a:t>rray[</a:t>
+            </a:r>
+            <a:r>
+              <a:rPr lang="en-NZ" sz="1400" dirty="0" smtClean="0">
+                <a:solidFill>
+                  <a:schemeClr val="accent2"/>
+                </a:solidFill>
+                <a:latin typeface="Calibri" pitchFamily="34" charset="0"/>
+                <a:cs typeface="Calibri" pitchFamily="34" charset="0"/>
+              </a:rPr>
+              <a:t>0</a:t>
+            </a:r>
+            <a:r>
+              <a:rPr lang="en-NZ" sz="1400" dirty="0" smtClean="0">
+                <a:latin typeface="Calibri" pitchFamily="34" charset="0"/>
+                <a:cs typeface="Calibri" pitchFamily="34" charset="0"/>
+              </a:rPr>
+              <a:t>] = temp;</a:t>
+            </a:r>
+            <a:endParaRPr lang="en-NZ" sz="1400" dirty="0">
+              <a:latin typeface="Calibri" pitchFamily="34" charset="0"/>
+              <a:cs typeface="Calibri" pitchFamily="34" charset="0"/>
+            </a:endParaRPr>
+          </a:p>
+        </p:txBody>
+      </p:sp>
+      <p:sp>
+        <p:nvSpPr>
+          <p:cNvPr id="6" name="Rectangle 5"/>
+          <p:cNvSpPr>
+            <a:spLocks noChangeAspect="1"/>
+          </p:cNvSpPr>
+          <p:nvPr/>
+        </p:nvSpPr>
+        <p:spPr>
+          <a:xfrm>
+            <a:off x="2627784" y="3933056"/>
+            <a:ext cx="3744417" cy="1800201"/>
+          </a:xfrm>
+          <a:prstGeom prst="rect">
+            <a:avLst/>
+          </a:prstGeom>
+          <a:solidFill>
+            <a:srgbClr val="B2B2B2"/>
+          </a:solidFill>
+        </p:spPr>
+        <p:style>
+          <a:lnRef idx="0">
+            <a:schemeClr val="accent1"/>
+          </a:lnRef>
+          <a:fillRef idx="3">
+            <a:schemeClr val="accent1"/>
+          </a:fillRef>
+          <a:effectRef idx="3">
+            <a:schemeClr val="accent1"/>
+          </a:effectRef>
+          <a:fontRef idx="minor">
+            <a:schemeClr val="lt1"/>
+          </a:fontRef>
+        </p:style>
+        <p:txBody>
+          <a:bodyPr rtlCol="0" anchor="ctr"/>
+          <a:lstStyle/>
+          <a:p>
+            <a:pPr algn="ctr"/>
+            <a:endParaRPr lang="en-NZ" sz="1200"/>
+          </a:p>
+        </p:txBody>
+      </p:sp>
+      <p:sp>
+        <p:nvSpPr>
+          <p:cNvPr id="7" name="Rectangle 6"/>
+          <p:cNvSpPr>
+            <a:spLocks noChangeAspect="1"/>
+          </p:cNvSpPr>
+          <p:nvPr/>
+        </p:nvSpPr>
+        <p:spPr>
+          <a:xfrm>
+            <a:off x="3419873" y="4005065"/>
+            <a:ext cx="2094978" cy="400110"/>
+          </a:xfrm>
+          <a:prstGeom prst="rect">
+            <a:avLst/>
+          </a:prstGeom>
+          <a:noFill/>
+          <a:ln>
+            <a:noFill/>
+          </a:ln>
+          <a:effectLst>
+            <a:outerShdw blurRad="50800" dist="38100" dir="2700000" algn="tl" rotWithShape="0">
+              <a:prstClr val="black">
+                <a:alpha val="40000"/>
+              </a:prstClr>
+            </a:outerShdw>
+          </a:effectLst>
+        </p:spPr>
+        <p:txBody>
+          <a:bodyPr wrap="square" lIns="91440" tIns="45720" rIns="91440" bIns="45720">
+            <a:spAutoFit/>
+          </a:bodyPr>
+          <a:lstStyle/>
+          <a:p>
+            <a:pPr algn="ctr"/>
+            <a:r>
+              <a:rPr lang="en-US" sz="2000" b="1" cap="none" spc="0" dirty="0" smtClean="0">
+                <a:ln w="12700">
+                  <a:noFill/>
+                  <a:prstDash val="solid"/>
+                </a:ln>
+                <a:effectLst>
+                  <a:outerShdw blurRad="41275" dist="20320" dir="1800000" algn="tl" rotWithShape="0">
+                    <a:srgbClr val="000000">
+                      <a:alpha val="40000"/>
+                    </a:srgbClr>
+                  </a:outerShdw>
+                </a:effectLst>
+                <a:latin typeface="Calibri" pitchFamily="34" charset="0"/>
+                <a:cs typeface="Calibri" pitchFamily="34" charset="0"/>
+              </a:rPr>
+              <a:t>Action Buffer</a:t>
+            </a:r>
+            <a:endParaRPr lang="en-US" sz="2000" b="1" cap="none" spc="0" dirty="0">
+              <a:ln w="12700">
+                <a:noFill/>
+                <a:prstDash val="solid"/>
+              </a:ln>
+              <a:effectLst>
+                <a:outerShdw blurRad="41275" dist="20320" dir="1800000" algn="tl" rotWithShape="0">
+                  <a:srgbClr val="000000">
+                    <a:alpha val="40000"/>
+                  </a:srgbClr>
+                </a:outerShdw>
+              </a:effectLst>
+              <a:latin typeface="Calibri" pitchFamily="34" charset="0"/>
+              <a:cs typeface="Calibri" pitchFamily="34" charset="0"/>
+            </a:endParaRPr>
+          </a:p>
+        </p:txBody>
+      </p:sp>
+      <p:graphicFrame>
+        <p:nvGraphicFramePr>
+          <p:cNvPr id="8" name="Table 7"/>
+          <p:cNvGraphicFramePr>
+            <a:graphicFrameLocks noGrp="1" noChangeAspect="1"/>
+          </p:cNvGraphicFramePr>
+          <p:nvPr/>
+        </p:nvGraphicFramePr>
+        <p:xfrm>
+          <a:off x="2771801" y="4509121"/>
+          <a:ext cx="3456383" cy="1080121"/>
+        </p:xfrm>
+        <a:graphic>
+          <a:graphicData uri="http://schemas.openxmlformats.org/drawingml/2006/table">
+            <a:tbl>
+              <a:tblPr firstRow="1" bandRow="1">
+                <a:solidFill>
+                  <a:srgbClr val="B2B2B2"/>
+                </a:solidFill>
+                <a:tableStyleId>{073A0DAA-6AF3-43AB-8588-CEC1D06C72B9}</a:tableStyleId>
+              </a:tblPr>
+              <a:tblGrid>
+                <a:gridCol w="648071"/>
+                <a:gridCol w="792088"/>
+                <a:gridCol w="1224136"/>
+                <a:gridCol w="792088"/>
+              </a:tblGrid>
+              <a:tr h="332345">
+                <a:tc>
+                  <a:txBody>
+                    <a:bodyPr/>
+                    <a:lstStyle/>
+                    <a:p>
+                      <a:r>
+                        <a:rPr lang="en-NZ" sz="1400" dirty="0" smtClean="0">
+                          <a:solidFill>
+                            <a:schemeClr val="tx1"/>
+                          </a:solidFill>
+                          <a:latin typeface="Calibri" pitchFamily="34" charset="0"/>
+                          <a:cs typeface="Calibri" pitchFamily="34" charset="0"/>
+                        </a:rPr>
+                        <a:t>Time</a:t>
+                      </a:r>
+                      <a:endParaRPr lang="en-NZ" sz="1400" dirty="0">
+                        <a:solidFill>
+                          <a:schemeClr val="tx1"/>
+                        </a:solidFill>
+                        <a:latin typeface="Calibri" pitchFamily="34" charset="0"/>
+                        <a:cs typeface="Calibri" pitchFamily="34" charset="0"/>
+                      </a:endParaRPr>
+                    </a:p>
+                  </a:txBody>
+                  <a:tcPr>
+                    <a:lnL w="12700" cap="flat" cmpd="sng" algn="ctr">
+                      <a:solidFill>
+                        <a:schemeClr val="tx1"/>
+                      </a:solidFill>
+                      <a:prstDash val="solid"/>
+                      <a:round/>
+                      <a:headEnd type="none" w="med" len="med"/>
+                      <a:tailEnd type="none" w="med" len="med"/>
+                    </a:lnL>
+                    <a:lnR w="12700" cap="flat" cmpd="sng" algn="ctr">
+                      <a:solidFill>
+                        <a:schemeClr val="tx1"/>
+                      </a:solidFill>
+                      <a:prstDash val="solid"/>
+                      <a:round/>
+                      <a:headEnd type="none" w="med" len="med"/>
+                      <a:tailEnd type="none" w="med" len="med"/>
+                    </a:lnR>
+                    <a:lnT w="12700" cap="flat" cmpd="sng" algn="ctr">
+                      <a:solidFill>
+                        <a:schemeClr val="tx1"/>
+                      </a:solidFill>
+                      <a:prstDash val="solid"/>
+                      <a:round/>
+                      <a:headEnd type="none" w="med" len="med"/>
+                      <a:tailEnd type="none" w="med" len="med"/>
+                    </a:lnT>
+                    <a:lnB w="38100" cap="flat" cmpd="sng" algn="ctr">
+                      <a:solidFill>
+                        <a:schemeClr val="tx1"/>
+                      </a:solidFill>
+                      <a:prstDash val="solid"/>
+                      <a:round/>
+                      <a:headEnd type="none" w="med" len="med"/>
+                      <a:tailEnd type="none" w="med" len="med"/>
+                    </a:lnB>
+                    <a:solidFill>
+                      <a:srgbClr val="B2B2B2"/>
+                    </a:solidFill>
+                  </a:tcPr>
+                </a:tc>
+                <a:tc>
+                  <a:txBody>
+                    <a:bodyPr/>
+                    <a:lstStyle/>
+                    <a:p>
+                      <a:r>
+                        <a:rPr lang="en-NZ" sz="1400" dirty="0" smtClean="0">
+                          <a:solidFill>
+                            <a:schemeClr val="tx1"/>
+                          </a:solidFill>
+                          <a:latin typeface="Calibri" pitchFamily="34" charset="0"/>
+                          <a:cs typeface="Calibri" pitchFamily="34" charset="0"/>
+                        </a:rPr>
+                        <a:t>Action</a:t>
+                      </a:r>
+                      <a:endParaRPr lang="en-NZ" sz="1400" dirty="0">
+                        <a:solidFill>
+                          <a:schemeClr val="tx1"/>
+                        </a:solidFill>
+                        <a:latin typeface="Calibri" pitchFamily="34" charset="0"/>
+                        <a:cs typeface="Calibri" pitchFamily="34" charset="0"/>
+                      </a:endParaRPr>
+                    </a:p>
+                  </a:txBody>
+                  <a:tcPr>
+                    <a:lnL w="12700" cap="flat" cmpd="sng" algn="ctr">
+                      <a:solidFill>
+                        <a:schemeClr val="tx1"/>
+                      </a:solidFill>
+                      <a:prstDash val="solid"/>
+                      <a:round/>
+                      <a:headEnd type="none" w="med" len="med"/>
+                      <a:tailEnd type="none" w="med" len="med"/>
+                    </a:lnL>
+                    <a:lnR w="12700" cap="flat" cmpd="sng" algn="ctr">
+                      <a:solidFill>
+                        <a:schemeClr val="tx1"/>
+                      </a:solidFill>
+                      <a:prstDash val="solid"/>
+                      <a:round/>
+                      <a:headEnd type="none" w="med" len="med"/>
+                      <a:tailEnd type="none" w="med" len="med"/>
+                    </a:lnR>
+                    <a:lnT w="12700" cap="flat" cmpd="sng" algn="ctr">
+                      <a:solidFill>
+                        <a:schemeClr val="tx1"/>
+                      </a:solidFill>
+                      <a:prstDash val="solid"/>
+                      <a:round/>
+                      <a:headEnd type="none" w="med" len="med"/>
+                      <a:tailEnd type="none" w="med" len="med"/>
+                    </a:lnT>
+                    <a:lnB w="38100" cap="flat" cmpd="sng" algn="ctr">
+                      <a:solidFill>
+                        <a:schemeClr val="tx1"/>
+                      </a:solidFill>
+                      <a:prstDash val="solid"/>
+                      <a:round/>
+                      <a:headEnd type="none" w="med" len="med"/>
+                      <a:tailEnd type="none" w="med" len="med"/>
+                    </a:lnB>
+                    <a:solidFill>
+                      <a:srgbClr val="B2B2B2"/>
+                    </a:solidFill>
+                  </a:tcPr>
+                </a:tc>
+                <a:tc>
+                  <a:txBody>
+                    <a:bodyPr/>
+                    <a:lstStyle/>
+                    <a:p>
+                      <a:r>
+                        <a:rPr lang="en-NZ" sz="1400" dirty="0" smtClean="0">
+                          <a:solidFill>
+                            <a:schemeClr val="tx1"/>
+                          </a:solidFill>
+                          <a:latin typeface="Calibri" pitchFamily="34" charset="0"/>
+                          <a:cs typeface="Calibri" pitchFamily="34" charset="0"/>
+                        </a:rPr>
+                        <a:t>From (time)</a:t>
+                      </a:r>
+                      <a:endParaRPr lang="en-NZ" sz="1400" dirty="0">
+                        <a:solidFill>
+                          <a:schemeClr val="tx1"/>
+                        </a:solidFill>
+                        <a:latin typeface="Calibri" pitchFamily="34" charset="0"/>
+                        <a:cs typeface="Calibri" pitchFamily="34" charset="0"/>
+                      </a:endParaRPr>
+                    </a:p>
+                  </a:txBody>
+                  <a:tcPr>
+                    <a:lnL w="12700" cap="flat" cmpd="sng" algn="ctr">
+                      <a:solidFill>
+                        <a:schemeClr val="tx1"/>
+                      </a:solidFill>
+                      <a:prstDash val="solid"/>
+                      <a:round/>
+                      <a:headEnd type="none" w="med" len="med"/>
+                      <a:tailEnd type="none" w="med" len="med"/>
+                    </a:lnL>
+                    <a:lnR w="12700" cap="flat" cmpd="sng" algn="ctr">
+                      <a:solidFill>
+                        <a:schemeClr val="tx1"/>
+                      </a:solidFill>
+                      <a:prstDash val="solid"/>
+                      <a:round/>
+                      <a:headEnd type="none" w="med" len="med"/>
+                      <a:tailEnd type="none" w="med" len="med"/>
+                    </a:lnR>
+                    <a:lnT w="12700" cap="flat" cmpd="sng" algn="ctr">
+                      <a:solidFill>
+                        <a:schemeClr val="tx1"/>
+                      </a:solidFill>
+                      <a:prstDash val="solid"/>
+                      <a:round/>
+                      <a:headEnd type="none" w="med" len="med"/>
+                      <a:tailEnd type="none" w="med" len="med"/>
+                    </a:lnT>
+                    <a:lnB w="38100" cap="flat" cmpd="sng" algn="ctr">
+                      <a:solidFill>
+                        <a:schemeClr val="tx1"/>
+                      </a:solidFill>
+                      <a:prstDash val="solid"/>
+                      <a:round/>
+                      <a:headEnd type="none" w="med" len="med"/>
+                      <a:tailEnd type="none" w="med" len="med"/>
+                    </a:lnB>
+                    <a:solidFill>
+                      <a:srgbClr val="B2B2B2"/>
+                    </a:solidFill>
+                  </a:tcPr>
+                </a:tc>
+                <a:tc>
+                  <a:txBody>
+                    <a:bodyPr/>
+                    <a:lstStyle/>
+                    <a:p>
+                      <a:pPr algn="l"/>
+                      <a:r>
+                        <a:rPr lang="en-NZ" sz="1400" dirty="0" smtClean="0">
+                          <a:solidFill>
+                            <a:schemeClr val="tx1"/>
+                          </a:solidFill>
+                          <a:latin typeface="Calibri" pitchFamily="34" charset="0"/>
+                          <a:cs typeface="Calibri" pitchFamily="34" charset="0"/>
+                        </a:rPr>
+                        <a:t>To</a:t>
+                      </a:r>
+                      <a:endParaRPr lang="en-NZ" sz="1400" dirty="0">
+                        <a:solidFill>
+                          <a:schemeClr val="tx1"/>
+                        </a:solidFill>
+                        <a:latin typeface="Calibri" pitchFamily="34" charset="0"/>
+                        <a:cs typeface="Calibri" pitchFamily="34" charset="0"/>
+                      </a:endParaRPr>
+                    </a:p>
+                  </a:txBody>
+                  <a:tcPr>
+                    <a:lnL w="12700" cap="flat" cmpd="sng" algn="ctr">
+                      <a:solidFill>
+                        <a:schemeClr val="tx1"/>
+                      </a:solidFill>
+                      <a:prstDash val="solid"/>
+                      <a:round/>
+                      <a:headEnd type="none" w="med" len="med"/>
+                      <a:tailEnd type="none" w="med" len="med"/>
+                    </a:lnL>
+                    <a:lnR w="12700" cap="flat" cmpd="sng" algn="ctr">
+                      <a:solidFill>
+                        <a:schemeClr val="tx1"/>
+                      </a:solidFill>
+                      <a:prstDash val="solid"/>
+                      <a:round/>
+                      <a:headEnd type="none" w="med" len="med"/>
+                      <a:tailEnd type="none" w="med" len="med"/>
+                    </a:lnR>
+                    <a:lnT w="12700" cap="flat" cmpd="sng" algn="ctr">
+                      <a:solidFill>
+                        <a:schemeClr val="tx1"/>
+                      </a:solidFill>
+                      <a:prstDash val="solid"/>
+                      <a:round/>
+                      <a:headEnd type="none" w="med" len="med"/>
+                      <a:tailEnd type="none" w="med" len="med"/>
+                    </a:lnT>
+                    <a:lnB w="38100" cap="flat" cmpd="sng" algn="ctr">
+                      <a:solidFill>
+                        <a:schemeClr val="tx1"/>
+                      </a:solidFill>
+                      <a:prstDash val="solid"/>
+                      <a:round/>
+                      <a:headEnd type="none" w="med" len="med"/>
+                      <a:tailEnd type="none" w="med" len="med"/>
+                    </a:lnB>
+                    <a:solidFill>
+                      <a:srgbClr val="B2B2B2"/>
+                    </a:solidFill>
+                  </a:tcPr>
+                </a:tc>
+              </a:tr>
+              <a:tr h="373888">
+                <a:tc>
+                  <a:txBody>
+                    <a:bodyPr/>
+                    <a:lstStyle/>
+                    <a:p>
+                      <a:r>
+                        <a:rPr lang="en-NZ" sz="1400" dirty="0" smtClean="0">
+                          <a:solidFill>
+                            <a:schemeClr val="tx1"/>
+                          </a:solidFill>
+                          <a:latin typeface="Calibri" pitchFamily="34" charset="0"/>
+                          <a:cs typeface="Calibri" pitchFamily="34" charset="0"/>
+                        </a:rPr>
+                        <a:t>1</a:t>
+                      </a:r>
+                      <a:endParaRPr lang="en-NZ" sz="1400" dirty="0">
+                        <a:solidFill>
+                          <a:schemeClr val="tx1"/>
+                        </a:solidFill>
+                        <a:latin typeface="Calibri" pitchFamily="34" charset="0"/>
+                        <a:cs typeface="Calibri" pitchFamily="34" charset="0"/>
+                      </a:endParaRPr>
+                    </a:p>
+                  </a:txBody>
+                  <a:tcPr>
+                    <a:lnL w="12700" cap="flat" cmpd="sng" algn="ctr">
+                      <a:solidFill>
+                        <a:schemeClr val="tx1"/>
+                      </a:solidFill>
+                      <a:prstDash val="solid"/>
+                      <a:round/>
+                      <a:headEnd type="none" w="med" len="med"/>
+                      <a:tailEnd type="none" w="med" len="med"/>
+                    </a:lnL>
+                    <a:lnR w="12700" cap="flat" cmpd="sng" algn="ctr">
+                      <a:solidFill>
+                        <a:schemeClr val="tx1"/>
+                      </a:solidFill>
+                      <a:prstDash val="solid"/>
+                      <a:round/>
+                      <a:headEnd type="none" w="med" len="med"/>
+                      <a:tailEnd type="none" w="med" len="med"/>
+                    </a:lnR>
+                    <a:lnT w="38100" cap="flat" cmpd="sng" algn="ctr">
+                      <a:solidFill>
+                        <a:schemeClr val="tx1"/>
+                      </a:solidFill>
+                      <a:prstDash val="solid"/>
+                      <a:round/>
+                      <a:headEnd type="none" w="med" len="med"/>
+                      <a:tailEnd type="none" w="med" len="med"/>
+                    </a:lnT>
+                    <a:lnB w="12700" cap="flat" cmpd="sng" algn="ctr">
+                      <a:solidFill>
+                        <a:schemeClr val="tx1"/>
+                      </a:solidFill>
+                      <a:prstDash val="solid"/>
+                      <a:round/>
+                      <a:headEnd type="none" w="med" len="med"/>
+                      <a:tailEnd type="none" w="med" len="med"/>
+                    </a:lnB>
+                    <a:solidFill>
+                      <a:srgbClr val="B2B2B2"/>
+                    </a:solidFill>
+                  </a:tcPr>
+                </a:tc>
+                <a:tc>
+                  <a:txBody>
+                    <a:bodyPr/>
+                    <a:lstStyle/>
+                    <a:p>
+                      <a:r>
+                        <a:rPr lang="en-NZ" sz="1400" dirty="0" smtClean="0">
+                          <a:solidFill>
+                            <a:schemeClr val="tx1"/>
+                          </a:solidFill>
+                          <a:latin typeface="Calibri" pitchFamily="34" charset="0"/>
+                          <a:cs typeface="Calibri" pitchFamily="34" charset="0"/>
+                        </a:rPr>
+                        <a:t>Assign</a:t>
+                      </a:r>
+                      <a:endParaRPr lang="en-NZ" sz="1400" dirty="0">
+                        <a:solidFill>
+                          <a:schemeClr val="tx1"/>
+                        </a:solidFill>
+                        <a:latin typeface="Calibri" pitchFamily="34" charset="0"/>
+                        <a:cs typeface="Calibri" pitchFamily="34" charset="0"/>
+                      </a:endParaRPr>
+                    </a:p>
+                  </a:txBody>
+                  <a:tcPr>
+                    <a:lnL w="12700" cap="flat" cmpd="sng" algn="ctr">
+                      <a:solidFill>
+                        <a:schemeClr val="tx1"/>
+                      </a:solidFill>
+                      <a:prstDash val="solid"/>
+                      <a:round/>
+                      <a:headEnd type="none" w="med" len="med"/>
+                      <a:tailEnd type="none" w="med" len="med"/>
+                    </a:lnL>
+                    <a:lnR w="12700" cap="flat" cmpd="sng" algn="ctr">
+                      <a:solidFill>
+                        <a:schemeClr val="tx1"/>
+                      </a:solidFill>
+                      <a:prstDash val="solid"/>
+                      <a:round/>
+                      <a:headEnd type="none" w="med" len="med"/>
+                      <a:tailEnd type="none" w="med" len="med"/>
+                    </a:lnR>
+                    <a:lnT w="38100" cap="flat" cmpd="sng" algn="ctr">
+                      <a:solidFill>
+                        <a:schemeClr val="tx1"/>
+                      </a:solidFill>
+                      <a:prstDash val="solid"/>
+                      <a:round/>
+                      <a:headEnd type="none" w="med" len="med"/>
+                      <a:tailEnd type="none" w="med" len="med"/>
+                    </a:lnT>
+                    <a:lnB w="12700" cap="flat" cmpd="sng" algn="ctr">
+                      <a:solidFill>
+                        <a:schemeClr val="tx1"/>
+                      </a:solidFill>
+                      <a:prstDash val="solid"/>
+                      <a:round/>
+                      <a:headEnd type="none" w="med" len="med"/>
+                      <a:tailEnd type="none" w="med" len="med"/>
+                    </a:lnB>
+                    <a:solidFill>
+                      <a:srgbClr val="B2B2B2"/>
+                    </a:solidFill>
+                  </a:tcPr>
+                </a:tc>
+                <a:tc>
+                  <a:txBody>
+                    <a:bodyPr/>
+                    <a:lstStyle/>
+                    <a:p>
+                      <a:pPr marL="0" marR="0" indent="0" algn="l" defTabSz="2818181" rtl="0" eaLnBrk="1" fontAlgn="auto" latinLnBrk="0" hangingPunct="1">
+                        <a:lnSpc>
+                          <a:spcPct val="100000"/>
+                        </a:lnSpc>
+                        <a:spcBef>
+                          <a:spcPts val="0"/>
+                        </a:spcBef>
+                        <a:spcAft>
+                          <a:spcPts val="0"/>
+                        </a:spcAft>
+                        <a:buClrTx/>
+                        <a:buSzTx/>
+                        <a:buFontTx/>
+                        <a:buNone/>
+                        <a:tabLst/>
+                        <a:defRPr/>
+                      </a:pPr>
+                      <a:r>
+                        <a:rPr lang="en-NZ" sz="1400" dirty="0" smtClean="0">
+                          <a:solidFill>
+                            <a:schemeClr val="tx1"/>
+                          </a:solidFill>
+                          <a:latin typeface="Calibri" pitchFamily="34" charset="0"/>
+                          <a:cs typeface="Calibri" pitchFamily="34" charset="0"/>
+                        </a:rPr>
+                        <a:t>array[0],</a:t>
+                      </a:r>
+                      <a:r>
+                        <a:rPr lang="en-NZ" sz="1400" baseline="0" dirty="0" smtClean="0">
+                          <a:solidFill>
+                            <a:schemeClr val="tx1"/>
+                          </a:solidFill>
+                          <a:latin typeface="Calibri" pitchFamily="34" charset="0"/>
+                          <a:cs typeface="Calibri" pitchFamily="34" charset="0"/>
+                        </a:rPr>
+                        <a:t> t</a:t>
+                      </a:r>
+                      <a:r>
+                        <a:rPr lang="en-NZ" sz="1400" baseline="-25000" dirty="0" smtClean="0">
+                          <a:solidFill>
+                            <a:schemeClr val="tx1"/>
+                          </a:solidFill>
+                          <a:latin typeface="Calibri" pitchFamily="34" charset="0"/>
+                          <a:cs typeface="Calibri" pitchFamily="34" charset="0"/>
+                        </a:rPr>
+                        <a:t>0</a:t>
+                      </a:r>
+                      <a:endParaRPr lang="en-NZ" sz="1400" baseline="-25000" dirty="0">
+                        <a:solidFill>
+                          <a:schemeClr val="tx1"/>
+                        </a:solidFill>
+                        <a:latin typeface="Calibri" pitchFamily="34" charset="0"/>
+                        <a:cs typeface="Calibri" pitchFamily="34" charset="0"/>
+                      </a:endParaRPr>
+                    </a:p>
+                  </a:txBody>
+                  <a:tcPr>
+                    <a:lnL w="12700" cap="flat" cmpd="sng" algn="ctr">
+                      <a:solidFill>
+                        <a:schemeClr val="tx1"/>
+                      </a:solidFill>
+                      <a:prstDash val="solid"/>
+                      <a:round/>
+                      <a:headEnd type="none" w="med" len="med"/>
+                      <a:tailEnd type="none" w="med" len="med"/>
+                    </a:lnL>
+                    <a:lnR w="12700" cap="flat" cmpd="sng" algn="ctr">
+                      <a:solidFill>
+                        <a:schemeClr val="tx1"/>
+                      </a:solidFill>
+                      <a:prstDash val="solid"/>
+                      <a:round/>
+                      <a:headEnd type="none" w="med" len="med"/>
+                      <a:tailEnd type="none" w="med" len="med"/>
+                    </a:lnR>
+                    <a:lnT w="38100" cap="flat" cmpd="sng" algn="ctr">
+                      <a:solidFill>
+                        <a:schemeClr val="tx1"/>
+                      </a:solidFill>
+                      <a:prstDash val="solid"/>
+                      <a:round/>
+                      <a:headEnd type="none" w="med" len="med"/>
+                      <a:tailEnd type="none" w="med" len="med"/>
+                    </a:lnT>
+                    <a:lnB w="12700" cap="flat" cmpd="sng" algn="ctr">
+                      <a:solidFill>
+                        <a:schemeClr val="tx1"/>
+                      </a:solidFill>
+                      <a:prstDash val="solid"/>
+                      <a:round/>
+                      <a:headEnd type="none" w="med" len="med"/>
+                      <a:tailEnd type="none" w="med" len="med"/>
+                    </a:lnB>
+                    <a:solidFill>
+                      <a:srgbClr val="B2B2B2"/>
+                    </a:solidFill>
+                  </a:tcPr>
+                </a:tc>
+                <a:tc>
+                  <a:txBody>
+                    <a:bodyPr/>
+                    <a:lstStyle/>
+                    <a:p>
+                      <a:r>
+                        <a:rPr lang="en-NZ" sz="1400" dirty="0" smtClean="0">
+                          <a:solidFill>
+                            <a:schemeClr val="tx1"/>
+                          </a:solidFill>
+                          <a:latin typeface="Calibri" pitchFamily="34" charset="0"/>
+                          <a:cs typeface="Calibri" pitchFamily="34" charset="0"/>
+                        </a:rPr>
+                        <a:t>array[1]</a:t>
+                      </a:r>
+                      <a:endParaRPr lang="en-NZ" sz="1400" dirty="0">
+                        <a:solidFill>
+                          <a:schemeClr val="tx1"/>
+                        </a:solidFill>
+                        <a:latin typeface="Calibri" pitchFamily="34" charset="0"/>
+                        <a:cs typeface="Calibri" pitchFamily="34" charset="0"/>
+                      </a:endParaRPr>
+                    </a:p>
+                  </a:txBody>
+                  <a:tcPr>
+                    <a:lnL w="12700" cap="flat" cmpd="sng" algn="ctr">
+                      <a:solidFill>
+                        <a:schemeClr val="tx1"/>
+                      </a:solidFill>
+                      <a:prstDash val="solid"/>
+                      <a:round/>
+                      <a:headEnd type="none" w="med" len="med"/>
+                      <a:tailEnd type="none" w="med" len="med"/>
+                    </a:lnL>
+                    <a:lnR w="12700" cap="flat" cmpd="sng" algn="ctr">
+                      <a:solidFill>
+                        <a:schemeClr val="tx1"/>
+                      </a:solidFill>
+                      <a:prstDash val="solid"/>
+                      <a:round/>
+                      <a:headEnd type="none" w="med" len="med"/>
+                      <a:tailEnd type="none" w="med" len="med"/>
+                    </a:lnR>
+                    <a:lnT w="38100" cap="flat" cmpd="sng" algn="ctr">
+                      <a:solidFill>
+                        <a:schemeClr val="tx1"/>
+                      </a:solidFill>
+                      <a:prstDash val="solid"/>
+                      <a:round/>
+                      <a:headEnd type="none" w="med" len="med"/>
+                      <a:tailEnd type="none" w="med" len="med"/>
+                    </a:lnT>
+                    <a:lnB w="12700" cap="flat" cmpd="sng" algn="ctr">
+                      <a:solidFill>
+                        <a:schemeClr val="tx1"/>
+                      </a:solidFill>
+                      <a:prstDash val="solid"/>
+                      <a:round/>
+                      <a:headEnd type="none" w="med" len="med"/>
+                      <a:tailEnd type="none" w="med" len="med"/>
+                    </a:lnB>
+                    <a:solidFill>
+                      <a:srgbClr val="B2B2B2"/>
+                    </a:solidFill>
+                  </a:tcPr>
+                </a:tc>
+              </a:tr>
+              <a:tr h="373888">
+                <a:tc>
+                  <a:txBody>
+                    <a:bodyPr/>
+                    <a:lstStyle/>
+                    <a:p>
+                      <a:r>
+                        <a:rPr lang="en-NZ" sz="1400" dirty="0" smtClean="0">
+                          <a:solidFill>
+                            <a:schemeClr val="tx1"/>
+                          </a:solidFill>
+                          <a:latin typeface="Calibri" pitchFamily="34" charset="0"/>
+                          <a:cs typeface="Calibri" pitchFamily="34" charset="0"/>
+                        </a:rPr>
+                        <a:t>2</a:t>
+                      </a:r>
+                      <a:endParaRPr lang="en-NZ" sz="1400" dirty="0">
+                        <a:solidFill>
+                          <a:schemeClr val="tx1"/>
+                        </a:solidFill>
+                        <a:latin typeface="Calibri" pitchFamily="34" charset="0"/>
+                        <a:cs typeface="Calibri" pitchFamily="34" charset="0"/>
+                      </a:endParaRPr>
+                    </a:p>
+                  </a:txBody>
+                  <a:tcPr>
+                    <a:lnL w="12700" cap="flat" cmpd="sng" algn="ctr">
+                      <a:solidFill>
+                        <a:schemeClr val="tx1"/>
+                      </a:solidFill>
+                      <a:prstDash val="solid"/>
+                      <a:round/>
+                      <a:headEnd type="none" w="med" len="med"/>
+                      <a:tailEnd type="none" w="med" len="med"/>
+                    </a:lnL>
+                    <a:lnR w="12700" cap="flat" cmpd="sng" algn="ctr">
+                      <a:solidFill>
+                        <a:schemeClr val="tx1"/>
+                      </a:solidFill>
+                      <a:prstDash val="solid"/>
+                      <a:round/>
+                      <a:headEnd type="none" w="med" len="med"/>
+                      <a:tailEnd type="none" w="med" len="med"/>
+                    </a:lnR>
+                    <a:lnT w="12700" cap="flat" cmpd="sng" algn="ctr">
+                      <a:solidFill>
+                        <a:schemeClr val="tx1"/>
+                      </a:solidFill>
+                      <a:prstDash val="solid"/>
+                      <a:round/>
+                      <a:headEnd type="none" w="med" len="med"/>
+                      <a:tailEnd type="none" w="med" len="med"/>
+                    </a:lnT>
+                    <a:lnB w="12700" cap="flat" cmpd="sng" algn="ctr">
+                      <a:solidFill>
+                        <a:schemeClr val="tx1"/>
+                      </a:solidFill>
+                      <a:prstDash val="solid"/>
+                      <a:round/>
+                      <a:headEnd type="none" w="med" len="med"/>
+                      <a:tailEnd type="none" w="med" len="med"/>
+                    </a:lnB>
+                    <a:solidFill>
+                      <a:srgbClr val="B2B2B2"/>
+                    </a:solidFill>
+                  </a:tcPr>
+                </a:tc>
+                <a:tc>
+                  <a:txBody>
+                    <a:bodyPr/>
+                    <a:lstStyle/>
+                    <a:p>
+                      <a:r>
+                        <a:rPr lang="en-NZ" sz="1400" dirty="0" smtClean="0">
+                          <a:solidFill>
+                            <a:schemeClr val="tx1"/>
+                          </a:solidFill>
+                          <a:latin typeface="Calibri" pitchFamily="34" charset="0"/>
+                          <a:cs typeface="Calibri" pitchFamily="34" charset="0"/>
+                        </a:rPr>
+                        <a:t>Assign</a:t>
+                      </a:r>
+                      <a:endParaRPr lang="en-NZ" sz="1400" dirty="0">
+                        <a:solidFill>
+                          <a:schemeClr val="tx1"/>
+                        </a:solidFill>
+                        <a:latin typeface="Calibri" pitchFamily="34" charset="0"/>
+                        <a:cs typeface="Calibri" pitchFamily="34" charset="0"/>
+                      </a:endParaRPr>
+                    </a:p>
+                  </a:txBody>
+                  <a:tcPr>
+                    <a:lnL w="12700" cap="flat" cmpd="sng" algn="ctr">
+                      <a:solidFill>
+                        <a:schemeClr val="tx1"/>
+                      </a:solidFill>
+                      <a:prstDash val="solid"/>
+                      <a:round/>
+                      <a:headEnd type="none" w="med" len="med"/>
+                      <a:tailEnd type="none" w="med" len="med"/>
+                    </a:lnL>
+                    <a:lnR w="12700" cap="flat" cmpd="sng" algn="ctr">
+                      <a:solidFill>
+                        <a:schemeClr val="tx1"/>
+                      </a:solidFill>
+                      <a:prstDash val="solid"/>
+                      <a:round/>
+                      <a:headEnd type="none" w="med" len="med"/>
+                      <a:tailEnd type="none" w="med" len="med"/>
+                    </a:lnR>
+                    <a:lnT w="12700" cap="flat" cmpd="sng" algn="ctr">
+                      <a:solidFill>
+                        <a:schemeClr val="tx1"/>
+                      </a:solidFill>
+                      <a:prstDash val="solid"/>
+                      <a:round/>
+                      <a:headEnd type="none" w="med" len="med"/>
+                      <a:tailEnd type="none" w="med" len="med"/>
+                    </a:lnT>
+                    <a:lnB w="12700" cap="flat" cmpd="sng" algn="ctr">
+                      <a:solidFill>
+                        <a:schemeClr val="tx1"/>
+                      </a:solidFill>
+                      <a:prstDash val="solid"/>
+                      <a:round/>
+                      <a:headEnd type="none" w="med" len="med"/>
+                      <a:tailEnd type="none" w="med" len="med"/>
+                    </a:lnB>
+                    <a:solidFill>
+                      <a:srgbClr val="B2B2B2"/>
+                    </a:solidFill>
+                  </a:tcPr>
+                </a:tc>
+                <a:tc>
+                  <a:txBody>
+                    <a:bodyPr/>
+                    <a:lstStyle/>
+                    <a:p>
+                      <a:r>
+                        <a:rPr lang="en-NZ" sz="1400" baseline="0" dirty="0" smtClean="0">
+                          <a:solidFill>
+                            <a:schemeClr val="tx1"/>
+                          </a:solidFill>
+                          <a:latin typeface="Calibri" pitchFamily="34" charset="0"/>
+                          <a:cs typeface="Calibri" pitchFamily="34" charset="0"/>
+                        </a:rPr>
+                        <a:t>array[1], t</a:t>
+                      </a:r>
+                      <a:r>
+                        <a:rPr lang="en-NZ" sz="1400" baseline="-25000" dirty="0" smtClean="0">
+                          <a:solidFill>
+                            <a:schemeClr val="tx1"/>
+                          </a:solidFill>
+                          <a:latin typeface="Calibri" pitchFamily="34" charset="0"/>
+                          <a:cs typeface="Calibri" pitchFamily="34" charset="0"/>
+                        </a:rPr>
+                        <a:t>0</a:t>
+                      </a:r>
+                      <a:endParaRPr lang="en-NZ" sz="1400" dirty="0">
+                        <a:solidFill>
+                          <a:schemeClr val="tx1"/>
+                        </a:solidFill>
+                        <a:latin typeface="Calibri" pitchFamily="34" charset="0"/>
+                        <a:cs typeface="Calibri" pitchFamily="34" charset="0"/>
+                      </a:endParaRPr>
+                    </a:p>
+                  </a:txBody>
+                  <a:tcPr>
+                    <a:lnL w="12700" cap="flat" cmpd="sng" algn="ctr">
+                      <a:solidFill>
+                        <a:schemeClr val="tx1"/>
+                      </a:solidFill>
+                      <a:prstDash val="solid"/>
+                      <a:round/>
+                      <a:headEnd type="none" w="med" len="med"/>
+                      <a:tailEnd type="none" w="med" len="med"/>
+                    </a:lnL>
+                    <a:lnR w="12700" cap="flat" cmpd="sng" algn="ctr">
+                      <a:solidFill>
+                        <a:schemeClr val="tx1"/>
+                      </a:solidFill>
+                      <a:prstDash val="solid"/>
+                      <a:round/>
+                      <a:headEnd type="none" w="med" len="med"/>
+                      <a:tailEnd type="none" w="med" len="med"/>
+                    </a:lnR>
+                    <a:lnT w="12700" cap="flat" cmpd="sng" algn="ctr">
+                      <a:solidFill>
+                        <a:schemeClr val="tx1"/>
+                      </a:solidFill>
+                      <a:prstDash val="solid"/>
+                      <a:round/>
+                      <a:headEnd type="none" w="med" len="med"/>
+                      <a:tailEnd type="none" w="med" len="med"/>
+                    </a:lnT>
+                    <a:lnB w="12700" cap="flat" cmpd="sng" algn="ctr">
+                      <a:solidFill>
+                        <a:schemeClr val="tx1"/>
+                      </a:solidFill>
+                      <a:prstDash val="solid"/>
+                      <a:round/>
+                      <a:headEnd type="none" w="med" len="med"/>
+                      <a:tailEnd type="none" w="med" len="med"/>
+                    </a:lnB>
+                    <a:solidFill>
+                      <a:srgbClr val="B2B2B2"/>
+                    </a:solidFill>
+                  </a:tcPr>
+                </a:tc>
+                <a:tc>
+                  <a:txBody>
+                    <a:bodyPr/>
+                    <a:lstStyle/>
+                    <a:p>
+                      <a:r>
+                        <a:rPr lang="en-NZ" sz="1400" dirty="0" smtClean="0">
+                          <a:solidFill>
+                            <a:schemeClr val="tx1"/>
+                          </a:solidFill>
+                          <a:latin typeface="Calibri" pitchFamily="34" charset="0"/>
+                          <a:cs typeface="Calibri" pitchFamily="34" charset="0"/>
+                        </a:rPr>
+                        <a:t>array[0]</a:t>
+                      </a:r>
+                      <a:endParaRPr lang="en-NZ" sz="1400" dirty="0">
+                        <a:solidFill>
+                          <a:schemeClr val="tx1"/>
+                        </a:solidFill>
+                        <a:latin typeface="Calibri" pitchFamily="34" charset="0"/>
+                        <a:cs typeface="Calibri" pitchFamily="34" charset="0"/>
+                      </a:endParaRPr>
+                    </a:p>
+                  </a:txBody>
+                  <a:tcPr>
+                    <a:lnL w="12700" cap="flat" cmpd="sng" algn="ctr">
+                      <a:solidFill>
+                        <a:schemeClr val="tx1"/>
+                      </a:solidFill>
+                      <a:prstDash val="solid"/>
+                      <a:round/>
+                      <a:headEnd type="none" w="med" len="med"/>
+                      <a:tailEnd type="none" w="med" len="med"/>
+                    </a:lnL>
+                    <a:lnR w="12700" cap="flat" cmpd="sng" algn="ctr">
+                      <a:solidFill>
+                        <a:schemeClr val="tx1"/>
+                      </a:solidFill>
+                      <a:prstDash val="solid"/>
+                      <a:round/>
+                      <a:headEnd type="none" w="med" len="med"/>
+                      <a:tailEnd type="none" w="med" len="med"/>
+                    </a:lnR>
+                    <a:lnT w="12700" cap="flat" cmpd="sng" algn="ctr">
+                      <a:solidFill>
+                        <a:schemeClr val="tx1"/>
+                      </a:solidFill>
+                      <a:prstDash val="solid"/>
+                      <a:round/>
+                      <a:headEnd type="none" w="med" len="med"/>
+                      <a:tailEnd type="none" w="med" len="med"/>
+                    </a:lnT>
+                    <a:lnB w="12700" cap="flat" cmpd="sng" algn="ctr">
+                      <a:solidFill>
+                        <a:schemeClr val="tx1"/>
+                      </a:solidFill>
+                      <a:prstDash val="solid"/>
+                      <a:round/>
+                      <a:headEnd type="none" w="med" len="med"/>
+                      <a:tailEnd type="none" w="med" len="med"/>
+                    </a:lnB>
+                    <a:solidFill>
+                      <a:srgbClr val="B2B2B2"/>
+                    </a:solidFill>
+                  </a:tcPr>
+                </a:tc>
+              </a:tr>
+            </a:tbl>
+          </a:graphicData>
+        </a:graphic>
+      </p:graphicFrame>
+      <p:sp>
+        <p:nvSpPr>
+          <p:cNvPr id="9" name="Right Brace 8"/>
+          <p:cNvSpPr>
+            <a:spLocks noChangeAspect="1"/>
+          </p:cNvSpPr>
+          <p:nvPr/>
+        </p:nvSpPr>
+        <p:spPr>
+          <a:xfrm>
+            <a:off x="6228184" y="4941168"/>
+            <a:ext cx="504056" cy="504056"/>
+          </a:xfrm>
+          <a:prstGeom prst="rightBrace">
+            <a:avLst>
+              <a:gd name="adj1" fmla="val 48646"/>
+              <a:gd name="adj2" fmla="val 50000"/>
+            </a:avLst>
+          </a:prstGeom>
+          <a:ln w="28575"/>
+        </p:spPr>
+        <p:style>
+          <a:lnRef idx="1">
+            <a:schemeClr val="dk1"/>
+          </a:lnRef>
+          <a:fillRef idx="0">
+            <a:schemeClr val="dk1"/>
+          </a:fillRef>
+          <a:effectRef idx="0">
+            <a:schemeClr val="dk1"/>
+          </a:effectRef>
+          <a:fontRef idx="minor">
+            <a:schemeClr val="tx1"/>
+          </a:fontRef>
+        </p:style>
+        <p:txBody>
+          <a:bodyPr rtlCol="0" anchor="ctr"/>
+          <a:lstStyle/>
+          <a:p>
+            <a:pPr algn="ctr"/>
+            <a:endParaRPr lang="en-NZ" sz="1200"/>
+          </a:p>
+        </p:txBody>
+      </p:sp>
+      <p:sp>
+        <p:nvSpPr>
+          <p:cNvPr id="10" name="Flowchart: Card 9"/>
+          <p:cNvSpPr>
+            <a:spLocks noChangeAspect="1"/>
+          </p:cNvSpPr>
+          <p:nvPr/>
+        </p:nvSpPr>
+        <p:spPr>
+          <a:xfrm>
+            <a:off x="6732240" y="4653136"/>
+            <a:ext cx="2016224" cy="864096"/>
+          </a:xfrm>
+          <a:prstGeom prst="flowChartPunchedCard">
+            <a:avLst/>
+          </a:prstGeom>
+          <a:solidFill>
+            <a:srgbClr val="CDCEB6"/>
+          </a:solidFill>
+        </p:spPr>
+        <p:style>
+          <a:lnRef idx="2">
+            <a:schemeClr val="accent1">
+              <a:shade val="50000"/>
+            </a:schemeClr>
+          </a:lnRef>
+          <a:fillRef idx="1">
+            <a:schemeClr val="accent1"/>
+          </a:fillRef>
+          <a:effectRef idx="0">
+            <a:schemeClr val="accent1"/>
+          </a:effectRef>
+          <a:fontRef idx="minor">
+            <a:schemeClr val="lt1"/>
+          </a:fontRef>
+        </p:style>
+        <p:txBody>
+          <a:bodyPr rtlCol="0" anchor="ctr"/>
+          <a:lstStyle/>
+          <a:p>
+            <a:r>
+              <a:rPr lang="en-NZ" sz="1400" dirty="0" smtClean="0">
+                <a:solidFill>
+                  <a:schemeClr val="tx1"/>
+                </a:solidFill>
+                <a:latin typeface="Calibri" pitchFamily="34" charset="0"/>
+                <a:cs typeface="Calibri" pitchFamily="34" charset="0"/>
+              </a:rPr>
+              <a:t>These actions conflict!</a:t>
+            </a:r>
+          </a:p>
+          <a:p>
+            <a:r>
+              <a:rPr lang="en-NZ" sz="1400" dirty="0" smtClean="0">
+                <a:solidFill>
+                  <a:schemeClr val="tx1"/>
+                </a:solidFill>
+                <a:latin typeface="Calibri" pitchFamily="34" charset="0"/>
+                <a:cs typeface="Calibri" pitchFamily="34" charset="0"/>
+              </a:rPr>
+              <a:t>Animate them simultaneously.</a:t>
+            </a:r>
+          </a:p>
+        </p:txBody>
+      </p:sp>
+      <p:cxnSp>
+        <p:nvCxnSpPr>
+          <p:cNvPr id="24" name="Straight Arrow Connector 23"/>
+          <p:cNvCxnSpPr/>
+          <p:nvPr/>
+        </p:nvCxnSpPr>
+        <p:spPr>
+          <a:xfrm flipV="1">
+            <a:off x="1979712" y="5013176"/>
+            <a:ext cx="792088" cy="72008"/>
+          </a:xfrm>
+          <a:prstGeom prst="straightConnector1">
+            <a:avLst/>
+          </a:prstGeom>
+          <a:ln w="25400">
+            <a:solidFill>
+              <a:schemeClr val="tx1"/>
+            </a:solidFill>
+            <a:tailEnd type="arrow"/>
+          </a:ln>
+        </p:spPr>
+        <p:style>
+          <a:lnRef idx="1">
+            <a:schemeClr val="accent1"/>
+          </a:lnRef>
+          <a:fillRef idx="0">
+            <a:schemeClr val="accent1"/>
+          </a:fillRef>
+          <a:effectRef idx="0">
+            <a:schemeClr val="accent1"/>
+          </a:effectRef>
+          <a:fontRef idx="minor">
+            <a:schemeClr val="tx1"/>
+          </a:fontRef>
+        </p:style>
+      </p:cxnSp>
+      <p:cxnSp>
+        <p:nvCxnSpPr>
+          <p:cNvPr id="26" name="Straight Arrow Connector 25"/>
+          <p:cNvCxnSpPr/>
+          <p:nvPr/>
+        </p:nvCxnSpPr>
+        <p:spPr>
+          <a:xfrm>
+            <a:off x="1907704" y="5373216"/>
+            <a:ext cx="864096" cy="72008"/>
+          </a:xfrm>
+          <a:prstGeom prst="straightConnector1">
+            <a:avLst/>
+          </a:prstGeom>
+          <a:ln w="25400">
+            <a:solidFill>
+              <a:schemeClr val="tx1"/>
+            </a:solidFill>
+            <a:tailEnd type="arrow"/>
+          </a:ln>
+        </p:spPr>
+        <p:style>
+          <a:lnRef idx="1">
+            <a:schemeClr val="accent1"/>
+          </a:lnRef>
+          <a:fillRef idx="0">
+            <a:schemeClr val="accent1"/>
+          </a:fillRef>
+          <a:effectRef idx="0">
+            <a:schemeClr val="accent1"/>
+          </a:effectRef>
+          <a:fontRef idx="minor">
+            <a:schemeClr val="tx1"/>
+          </a:fontRef>
+        </p:style>
+      </p:cxnSp>
     </p:spTree>
   </p:cSld>
   <p:clrMapOvr>

</xml_diff>